<commit_message>
Updated MA PowerPoint template to latest version from MA-Internal repository.
</commit_message>
<xml_diff>
--- a/MA-PowerPoint-template.pptx
+++ b/MA-PowerPoint-template.pptx
@@ -2,18 +2,18 @@
 <file path=ppt/presentation.xml><?xml version="1.0" encoding="utf-8"?>
 <p:presentation xmlns:a="http://schemas.openxmlformats.org/drawingml/2006/main" xmlns:r="http://schemas.openxmlformats.org/officeDocument/2006/relationships" xmlns:p="http://schemas.openxmlformats.org/presentationml/2006/main" embedTrueTypeFonts="1">
   <p:sldMasterIdLst>
-    <p:sldMasterId id="2147483649" r:id="rId3"/>
+    <p:sldMasterId id="2147483649" r:id="rId1"/>
   </p:sldMasterIdLst>
   <p:notesMasterIdLst>
-    <p:notesMasterId r:id="rId7"/>
+    <p:notesMasterId r:id="rId5"/>
   </p:notesMasterIdLst>
   <p:handoutMasterIdLst>
-    <p:handoutMasterId r:id="rId8"/>
+    <p:handoutMasterId r:id="rId6"/>
   </p:handoutMasterIdLst>
   <p:sldIdLst>
-    <p:sldId id="388" r:id="rId4"/>
-    <p:sldId id="386" r:id="rId5"/>
-    <p:sldId id="387" r:id="rId6"/>
+    <p:sldId id="388" r:id="rId2"/>
+    <p:sldId id="386" r:id="rId3"/>
+    <p:sldId id="387" r:id="rId4"/>
   </p:sldIdLst>
   <p:sldSz cx="12192000" cy="6858000"/>
   <p:notesSz cx="6858000" cy="9144000"/>
@@ -436,7 +436,7 @@
               <a:pPr>
                 <a:defRPr/>
               </a:pPr>
-              <a:t>‹Nr.›</a:t>
+              <a:t>‹#›</a:t>
             </a:fld>
             <a:endParaRPr lang="de-DE" altLang="en-US" dirty="0">
               <a:solidFill>
@@ -625,7 +625,7 @@
             <a:fld id="{3C942721-1DB2-41DB-991E-7916585D3FBD}" type="slidenum">
               <a:rPr lang="en-US" smtClean="0"/>
               <a:pPr/>
-              <a:t>‹Nr.›</a:t>
+              <a:t>‹#›</a:t>
             </a:fld>
             <a:endParaRPr lang="en-US" dirty="0"/>
           </a:p>
@@ -727,7 +727,7 @@
             <a:fld id="{0ACCA4EB-2A83-4DF3-B096-4CBAF8F3FE99}" type="datetimeFigureOut">
               <a:rPr lang="en-US" smtClean="0"/>
               <a:pPr/>
-              <a:t>11/23/2023</a:t>
+              <a:t>11/20/2023</a:t>
             </a:fld>
             <a:endParaRPr lang="en-US" dirty="0"/>
           </a:p>
@@ -2481,7 +2481,7 @@
                 </a:spcBef>
                 <a:defRPr/>
               </a:pPr>
-              <a:t>‹Nr.›</a:t>
+              <a:t>‹#›</a:t>
             </a:fld>
             <a:endParaRPr lang="de-DE" altLang="en-US" sz="1000" dirty="0">
               <a:solidFill>
@@ -2592,7 +2592,7 @@
                 <a14:useLocalDpi xmlns:a14="http://schemas.microsoft.com/office/drawing/2010/main" val="0"/>
               </a:ext>
               <a:ext uri="{96DAC541-7B7A-43D3-8B79-37D633B846F1}">
-                <asvg:svgBlip xmlns:asvg="http://schemas.microsoft.com/office/drawing/2016/SVG/main" xmlns="" r:embed="rId11"/>
+                <asvg:svgBlip xmlns="" xmlns:asvg="http://schemas.microsoft.com/office/drawing/2016/SVG/main" r:embed="rId11"/>
               </a:ext>
             </a:extLst>
           </a:blip>
@@ -4099,7 +4099,7 @@
 <file path=ppt/theme/theme1.xml><?xml version="1.0" encoding="utf-8"?>
 <a:theme xmlns:a="http://schemas.openxmlformats.org/drawingml/2006/main" name="eFMI®">
   <a:themeElements>
-    <a:clrScheme name="eFMI®">
+    <a:clrScheme name="Modelica Association">
       <a:dk1>
         <a:srgbClr val="5E676E"/>
       </a:dk1>
@@ -5138,88 +5138,4 @@
   <a:objectDefaults/>
   <a:extraClrSchemeLst/>
 </a:theme>
-</file>
-
-<file path=customXml/item1.xml><?xml version="1.0" encoding="utf-8"?>
-<ct:contentTypeSchema xmlns:ct="http://schemas.microsoft.com/office/2006/metadata/contentType" xmlns:ma="http://schemas.microsoft.com/office/2006/metadata/properties/metaAttributes" ct:_="" ma:_="" ma:contentTypeName="Document" ma:contentTypeID="0x0101004E5FCAD8E6222F478CF98AE6458717E4" ma:contentTypeVersion="0" ma:contentTypeDescription="Create a new document." ma:contentTypeScope="" ma:versionID="ae4c969974cdc097ec4092e4953e579e">
-  <xsd:schema xmlns:xsd="http://www.w3.org/2001/XMLSchema" xmlns:p="http://schemas.microsoft.com/office/2006/metadata/properties" targetNamespace="http://schemas.microsoft.com/office/2006/metadata/properties" ma:root="true" ma:fieldsID="9684e7e44b4b32ae9d4fdaa413507a5d">
-    <xsd:element name="properties">
-      <xsd:complexType>
-        <xsd:sequence>
-          <xsd:element name="documentManagement">
-            <xsd:complexType>
-              <xsd:all/>
-            </xsd:complexType>
-          </xsd:element>
-        </xsd:sequence>
-      </xsd:complexType>
-    </xsd:element>
-  </xsd:schema>
-  <xsd:schema xmlns="http://schemas.openxmlformats.org/package/2006/metadata/core-properties" xmlns:xsd="http://www.w3.org/2001/XMLSchema" xmlns:xsi="http://www.w3.org/2001/XMLSchema-instance" xmlns:dc="http://purl.org/dc/elements/1.1/" xmlns:dcterms="http://purl.org/dc/terms/" xmlns:odoc="http://schemas.microsoft.com/office/internal/2005/internalDocumentation" targetNamespace="http://schemas.openxmlformats.org/package/2006/metadata/core-properties" elementFormDefault="qualified" attributeFormDefault="unqualified" blockDefault="#all">
-    <xsd:import namespace="http://purl.org/dc/elements/1.1/" schemaLocation="http://dublincore.org/schemas/xmls/qdc/2003/04/02/dc.xsd"/>
-    <xsd:import namespace="http://purl.org/dc/terms/" schemaLocation="http://dublincore.org/schemas/xmls/qdc/2003/04/02/dcterms.xsd"/>
-    <xsd:element name="coreProperties" type="CT_coreProperties"/>
-    <xsd:complexType name="CT_coreProperties">
-      <xsd:all>
-        <xsd:element ref="dc:creator" minOccurs="0" maxOccurs="1"/>
-        <xsd:element ref="dcterms:created" minOccurs="0" maxOccurs="1"/>
-        <xsd:element ref="dc:identifier" minOccurs="0" maxOccurs="1"/>
-        <xsd:element name="contentType" minOccurs="0" maxOccurs="1" type="xsd:string" ma:index="0" ma:displayName="Content Type" ma:readOnly="true"/>
-        <xsd:element ref="dc:title" minOccurs="0" maxOccurs="1" ma:index="4" ma:displayName="Title"/>
-        <xsd:element ref="dc:subject" minOccurs="0" maxOccurs="1"/>
-        <xsd:element ref="dc:description" minOccurs="0" maxOccurs="1"/>
-        <xsd:element name="keywords" minOccurs="0" maxOccurs="1" type="xsd:string"/>
-        <xsd:element ref="dc:language" minOccurs="0" maxOccurs="1"/>
-        <xsd:element name="category" minOccurs="0" maxOccurs="1" type="xsd:string"/>
-        <xsd:element name="version" minOccurs="0" maxOccurs="1" type="xsd:string"/>
-        <xsd:element name="revision" minOccurs="0" maxOccurs="1" type="xsd:string">
-          <xsd:annotation>
-            <xsd:documentation>
-                        This value indicates the number of saves or revisions. The application is responsible for updating this value after each revision.
-                    </xsd:documentation>
-          </xsd:annotation>
-        </xsd:element>
-        <xsd:element name="lastModifiedBy" minOccurs="0" maxOccurs="1" type="xsd:string"/>
-        <xsd:element ref="dcterms:modified" minOccurs="0" maxOccurs="1"/>
-        <xsd:element name="lastPrinted" minOccurs="0" maxOccurs="1" type="xsd:dateTime"/>
-        <xsd:element name="contentStatus" minOccurs="0" maxOccurs="1" type="xsd:string"/>
-      </xsd:all>
-    </xsd:complexType>
-  </xsd:schema>
-</ct:contentTypeSchema>
-</file>
-
-<file path=customXml/item2.xml><?xml version="1.0" encoding="utf-8"?>
-<p:properties xmlns:p="http://schemas.microsoft.com/office/2006/metadata/properties" xmlns:xsi="http://www.w3.org/2001/XMLSchema-instance" xmlns:pc="http://schemas.microsoft.com/office/infopath/2007/PartnerControls">
-  <documentManagement/>
-</p:properties>
-</file>
-
-<file path=customXml/itemProps1.xml><?xml version="1.0" encoding="utf-8"?>
-<ds:datastoreItem xmlns:ds="http://schemas.openxmlformats.org/officeDocument/2006/customXml" ds:itemID="{D6DDF4F8-48B7-40A7-A044-30F13F7F87CD}">
-  <ds:schemaRefs>
-    <ds:schemaRef ds:uri="http://schemas.microsoft.com/office/2006/metadata/contentType"/>
-    <ds:schemaRef ds:uri="http://schemas.microsoft.com/office/2006/metadata/properties/metaAttributes"/>
-    <ds:schemaRef ds:uri="http://www.w3.org/2001/XMLSchema"/>
-    <ds:schemaRef ds:uri="http://schemas.microsoft.com/office/2006/metadata/properties"/>
-    <ds:schemaRef ds:uri="http://schemas.openxmlformats.org/package/2006/metadata/core-properties"/>
-    <ds:schemaRef ds:uri="http://purl.org/dc/elements/1.1/"/>
-    <ds:schemaRef ds:uri="http://purl.org/dc/terms/"/>
-    <ds:schemaRef ds:uri="http://schemas.microsoft.com/office/internal/2005/internalDocumentation"/>
-  </ds:schemaRefs>
-</ds:datastoreItem>
-</file>
-
-<file path=customXml/itemProps2.xml><?xml version="1.0" encoding="utf-8"?>
-<ds:datastoreItem xmlns:ds="http://schemas.openxmlformats.org/officeDocument/2006/customXml" ds:itemID="{2605D1E8-C791-4C95-A083-CBF3AF871BEC}">
-  <ds:schemaRefs>
-    <ds:schemaRef ds:uri="http://schemas.openxmlformats.org/package/2006/metadata/core-properties"/>
-    <ds:schemaRef ds:uri="http://schemas.microsoft.com/office/2006/documentManagement/types"/>
-    <ds:schemaRef ds:uri="http://purl.org/dc/elements/1.1/"/>
-    <ds:schemaRef ds:uri="http://www.w3.org/XML/1998/namespace"/>
-    <ds:schemaRef ds:uri="http://schemas.microsoft.com/office/2006/metadata/properties"/>
-    <ds:schemaRef ds:uri="http://purl.org/dc/dcmitype/"/>
-    <ds:schemaRef ds:uri="http://purl.org/dc/terms/"/>
-  </ds:schemaRefs>
-</ds:datastoreItem>
 </file>
</xml_diff>